<commit_message>
Update with Monthly Multiple Regression Models
</commit_message>
<xml_diff>
--- a/Superior/doc/Preliminary Multiple Regression Analysis of Lake Superior Water.pptx
+++ b/Superior/doc/Preliminary Multiple Regression Analysis of Lake Superior Water.pptx
@@ -1293,12 +1293,16 @@
         <p:spPr>
           <a:xfrm>
             <a:off x="609600" y="1447800"/>
-            <a:ext cx="6934200" cy="3693319"/>
+            <a:ext cx="6934200" cy="5078313"/>
           </a:xfrm>
           <a:prstGeom prst="rect">
             <a:avLst/>
           </a:prstGeom>
-          <a:noFill/>
+          <a:solidFill>
+            <a:schemeClr val="bg1">
+              <a:lumMod val="95000"/>
+            </a:schemeClr>
+          </a:solidFill>
         </p:spPr>
         <p:txBody>
           <a:bodyPr wrap="square" rtlCol="0">
@@ -1362,7 +1366,7 @@
             </a:pPr>
             <a:r>
               <a:rPr lang="en-US" dirty="0" smtClean="0"/>
-              <a:t>Autoregressive Model</a:t>
+              <a:t>Autoregressive Multiple Regression Model</a:t>
             </a:r>
           </a:p>
           <a:p>
@@ -1388,7 +1392,7 @@
             </a:r>
             <a:r>
               <a:rPr lang="en-US" dirty="0" smtClean="0"/>
-              <a:t> improve model prediction accuracy</a:t>
+              <a:t> improve model prediction </a:t>
             </a:r>
           </a:p>
           <a:p>
@@ -1480,12 +1484,67 @@
             </a:pPr>
             <a:r>
               <a:rPr lang="en-US" dirty="0" smtClean="0"/>
-              <a:t>Jan-Feb Parameters differs from </a:t>
-            </a:r>
-            <a:r>
-              <a:rPr lang="en-US" smtClean="0"/>
-              <a:t>Mar-Dec Parameters</a:t>
-            </a:r>
+              <a:t>Jan-Feb Parameters differs from Mar-Dec Parameters</a:t>
+            </a:r>
+          </a:p>
+          <a:p>
+            <a:pPr marL="742950" lvl="1" indent="-285750">
+              <a:buFont typeface="Arial" panose="020B0604020202020204" pitchFamily="34" charset="0"/>
+              <a:buChar char="•"/>
+            </a:pPr>
+            <a:r>
+              <a:rPr lang="en-US" dirty="0" smtClean="0"/>
+              <a:t>Jan-Feb parameters for AR2, </a:t>
+            </a:r>
+            <a:r>
+              <a:rPr lang="en-US" dirty="0" err="1" smtClean="0"/>
+              <a:t>prec</a:t>
+            </a:r>
+            <a:r>
+              <a:rPr lang="en-US" dirty="0" smtClean="0"/>
+              <a:t>, </a:t>
+            </a:r>
+            <a:r>
+              <a:rPr lang="en-US" dirty="0" err="1" smtClean="0"/>
+              <a:t>rOff</a:t>
+            </a:r>
+            <a:r>
+              <a:rPr lang="en-US" dirty="0" smtClean="0"/>
+              <a:t>, and </a:t>
+            </a:r>
+            <a:r>
+              <a:rPr lang="en-US" dirty="0" err="1" smtClean="0"/>
+              <a:t>evap</a:t>
+            </a:r>
+            <a:r>
+              <a:rPr lang="en-US" dirty="0"/>
+              <a:t> </a:t>
+            </a:r>
+            <a:r>
+              <a:rPr lang="en-US" dirty="0" smtClean="0"/>
+              <a:t>are marginally significant </a:t>
+            </a:r>
+          </a:p>
+          <a:p>
+            <a:pPr marL="742950" lvl="1" indent="-285750">
+              <a:buFont typeface="Arial" panose="020B0604020202020204" pitchFamily="34" charset="0"/>
+              <a:buChar char="•"/>
+            </a:pPr>
+            <a:r>
+              <a:rPr lang="en-US" dirty="0" smtClean="0"/>
+              <a:t>Jan-Feb model may indicate a need to account for thermal </a:t>
+            </a:r>
+            <a:r>
+              <a:rPr lang="en-US" dirty="0" smtClean="0"/>
+              <a:t>expansion</a:t>
+            </a:r>
+          </a:p>
+          <a:p>
+            <a:pPr marL="742950" lvl="1" indent="-285750">
+              <a:buFont typeface="Arial" panose="020B0604020202020204" pitchFamily="34" charset="0"/>
+              <a:buChar char="•"/>
+            </a:pPr>
+            <a:endParaRPr lang="en-US" dirty="0"/>
           </a:p>
           <a:p>
             <a:pPr marL="742950" lvl="1" indent="-285750">
@@ -1500,6 +1559,41 @@
               <a:buChar char="•"/>
             </a:pPr>
             <a:endParaRPr lang="en-US" dirty="0"/>
+          </a:p>
+        </p:txBody>
+      </p:sp>
+      <p:sp>
+        <p:nvSpPr>
+          <p:cNvPr id="4" name="TextBox 3"/>
+          <p:cNvSpPr txBox="1"/>
+          <p:nvPr/>
+        </p:nvSpPr>
+        <p:spPr>
+          <a:xfrm>
+            <a:off x="738352" y="6019800"/>
+            <a:ext cx="5237331" cy="369332"/>
+          </a:xfrm>
+          <a:prstGeom prst="rect">
+            <a:avLst/>
+          </a:prstGeom>
+          <a:noFill/>
+        </p:spPr>
+        <p:txBody>
+          <a:bodyPr wrap="none" rtlCol="0">
+            <a:spAutoFit/>
+          </a:bodyPr>
+          <a:lstStyle/>
+          <a:p>
+            <a:r>
+              <a:rPr lang="en-US" dirty="0">
+                <a:solidFill>
+                  <a:schemeClr val="accent5">
+                    <a:lumMod val="50000"/>
+                  </a:schemeClr>
+                </a:solidFill>
+              </a:rPr>
+              <a:t>https://github.com/dholtschlag-usgs/LakeSuperior</a:t>
+            </a:r>
           </a:p>
         </p:txBody>
       </p:sp>
@@ -1591,7 +1685,7 @@
         </p:blipFill>
         <p:spPr bwMode="auto">
           <a:xfrm>
-            <a:off x="1295400" y="1660306"/>
+            <a:off x="457200" y="1888906"/>
             <a:ext cx="5267325" cy="257175"/>
           </a:xfrm>
           <a:prstGeom prst="rect">
@@ -1645,7 +1739,7 @@
         </p:blipFill>
         <p:spPr bwMode="auto">
           <a:xfrm>
-            <a:off x="1295400" y="2193706"/>
+            <a:off x="457200" y="2422306"/>
             <a:ext cx="5429250" cy="2000250"/>
           </a:xfrm>
           <a:prstGeom prst="rect">
@@ -1699,7 +1793,7 @@
         </p:blipFill>
         <p:spPr bwMode="auto">
           <a:xfrm>
-            <a:off x="1295400" y="4514850"/>
+            <a:off x="457200" y="4743450"/>
             <a:ext cx="5715000" cy="742950"/>
           </a:xfrm>
           <a:prstGeom prst="rect">
@@ -1730,6 +1824,184 @@
           </a:extLst>
         </p:spPr>
       </p:pic>
+      <p:sp>
+        <p:nvSpPr>
+          <p:cNvPr id="2" name="TextBox 1"/>
+          <p:cNvSpPr txBox="1"/>
+          <p:nvPr/>
+        </p:nvSpPr>
+        <p:spPr>
+          <a:xfrm>
+            <a:off x="6400800" y="1875768"/>
+            <a:ext cx="2590800" cy="2031325"/>
+          </a:xfrm>
+          <a:prstGeom prst="rect">
+            <a:avLst/>
+          </a:prstGeom>
+          <a:solidFill>
+            <a:schemeClr val="bg1">
+              <a:lumMod val="95000"/>
+            </a:schemeClr>
+          </a:solidFill>
+        </p:spPr>
+        <p:txBody>
+          <a:bodyPr wrap="square" rtlCol="0">
+            <a:spAutoFit/>
+          </a:bodyPr>
+          <a:lstStyle/>
+          <a:p>
+            <a:r>
+              <a:rPr lang="en-US" sz="1400" b="1" dirty="0" smtClean="0">
+                <a:latin typeface="Monotype Sans WT J" panose="020B0502000000000001" pitchFamily="34" charset="-128"/>
+                <a:ea typeface="Monotype Sans WT J" panose="020B0502000000000001" pitchFamily="34" charset="-128"/>
+                <a:cs typeface="Monotype Sans WT J" panose="020B0502000000000001" pitchFamily="34" charset="-128"/>
+              </a:rPr>
+              <a:t>Key to Variable Names:</a:t>
+            </a:r>
+          </a:p>
+          <a:p>
+            <a:r>
+              <a:rPr lang="en-US" sz="1400" dirty="0" smtClean="0">
+                <a:latin typeface="Monotype Sans WT J" panose="020B0502000000000001" pitchFamily="34" charset="-128"/>
+                <a:ea typeface="Monotype Sans WT J" panose="020B0502000000000001" pitchFamily="34" charset="-128"/>
+                <a:cs typeface="Monotype Sans WT J" panose="020B0502000000000001" pitchFamily="34" charset="-128"/>
+              </a:rPr>
+              <a:t>--------------------------------</a:t>
+            </a:r>
+          </a:p>
+          <a:p>
+            <a:r>
+              <a:rPr lang="en-US" sz="1400" dirty="0" err="1" smtClean="0">
+                <a:latin typeface="Monotype Sans WT J" panose="020B0502000000000001" pitchFamily="34" charset="-128"/>
+                <a:ea typeface="Monotype Sans WT J" panose="020B0502000000000001" pitchFamily="34" charset="-128"/>
+                <a:cs typeface="Monotype Sans WT J" panose="020B0502000000000001" pitchFamily="34" charset="-128"/>
+              </a:rPr>
+              <a:t>stmr</a:t>
+            </a:r>
+            <a:r>
+              <a:rPr lang="en-US" sz="1400" dirty="0" smtClean="0">
+                <a:latin typeface="Monotype Sans WT J" panose="020B0502000000000001" pitchFamily="34" charset="-128"/>
+                <a:ea typeface="Monotype Sans WT J" panose="020B0502000000000001" pitchFamily="34" charset="-128"/>
+                <a:cs typeface="Monotype Sans WT J" panose="020B0502000000000001" pitchFamily="34" charset="-128"/>
+              </a:rPr>
+              <a:t>:  St. Marys River</a:t>
+            </a:r>
+          </a:p>
+          <a:p>
+            <a:r>
+              <a:rPr lang="en-US" sz="1400" dirty="0" err="1" smtClean="0">
+                <a:latin typeface="Monotype Sans WT J" panose="020B0502000000000001" pitchFamily="34" charset="-128"/>
+                <a:ea typeface="Monotype Sans WT J" panose="020B0502000000000001" pitchFamily="34" charset="-128"/>
+                <a:cs typeface="Monotype Sans WT J" panose="020B0502000000000001" pitchFamily="34" charset="-128"/>
+              </a:rPr>
+              <a:t>prec</a:t>
+            </a:r>
+            <a:r>
+              <a:rPr lang="en-US" sz="1400" dirty="0" smtClean="0">
+                <a:latin typeface="Monotype Sans WT J" panose="020B0502000000000001" pitchFamily="34" charset="-128"/>
+                <a:ea typeface="Monotype Sans WT J" panose="020B0502000000000001" pitchFamily="34" charset="-128"/>
+                <a:cs typeface="Monotype Sans WT J" panose="020B0502000000000001" pitchFamily="34" charset="-128"/>
+              </a:rPr>
+              <a:t>:  Overlake precipitation</a:t>
+            </a:r>
+          </a:p>
+          <a:p>
+            <a:r>
+              <a:rPr lang="en-US" sz="1400" dirty="0" err="1" smtClean="0">
+                <a:latin typeface="Monotype Sans WT J" panose="020B0502000000000001" pitchFamily="34" charset="-128"/>
+                <a:ea typeface="Monotype Sans WT J" panose="020B0502000000000001" pitchFamily="34" charset="-128"/>
+                <a:cs typeface="Monotype Sans WT J" panose="020B0502000000000001" pitchFamily="34" charset="-128"/>
+              </a:rPr>
+              <a:t>rOff</a:t>
+            </a:r>
+            <a:r>
+              <a:rPr lang="en-US" sz="1400" dirty="0" smtClean="0">
+                <a:latin typeface="Monotype Sans WT J" panose="020B0502000000000001" pitchFamily="34" charset="-128"/>
+                <a:ea typeface="Monotype Sans WT J" panose="020B0502000000000001" pitchFamily="34" charset="-128"/>
+                <a:cs typeface="Monotype Sans WT J" panose="020B0502000000000001" pitchFamily="34" charset="-128"/>
+              </a:rPr>
+              <a:t>:   Basin runoff</a:t>
+            </a:r>
+          </a:p>
+          <a:p>
+            <a:r>
+              <a:rPr lang="en-US" sz="1400" dirty="0" err="1" smtClean="0">
+                <a:latin typeface="Monotype Sans WT J" panose="020B0502000000000001" pitchFamily="34" charset="-128"/>
+                <a:ea typeface="Monotype Sans WT J" panose="020B0502000000000001" pitchFamily="34" charset="-128"/>
+                <a:cs typeface="Monotype Sans WT J" panose="020B0502000000000001" pitchFamily="34" charset="-128"/>
+              </a:rPr>
+              <a:t>evap</a:t>
+            </a:r>
+            <a:r>
+              <a:rPr lang="en-US" sz="1400" dirty="0" smtClean="0">
+                <a:latin typeface="Monotype Sans WT J" panose="020B0502000000000001" pitchFamily="34" charset="-128"/>
+                <a:ea typeface="Monotype Sans WT J" panose="020B0502000000000001" pitchFamily="34" charset="-128"/>
+                <a:cs typeface="Monotype Sans WT J" panose="020B0502000000000001" pitchFamily="34" charset="-128"/>
+              </a:rPr>
+              <a:t>:  Overlake Evaporation</a:t>
+            </a:r>
+          </a:p>
+          <a:p>
+            <a:r>
+              <a:rPr lang="en-US" sz="1400" dirty="0" err="1" smtClean="0">
+                <a:latin typeface="Monotype Sans WT J" panose="020B0502000000000001" pitchFamily="34" charset="-128"/>
+                <a:ea typeface="Monotype Sans WT J" panose="020B0502000000000001" pitchFamily="34" charset="-128"/>
+                <a:cs typeface="Monotype Sans WT J" panose="020B0502000000000001" pitchFamily="34" charset="-128"/>
+              </a:rPr>
+              <a:t>dSto</a:t>
+            </a:r>
+            <a:r>
+              <a:rPr lang="en-US" sz="1400" dirty="0" smtClean="0">
+                <a:latin typeface="Monotype Sans WT J" panose="020B0502000000000001" pitchFamily="34" charset="-128"/>
+                <a:ea typeface="Monotype Sans WT J" panose="020B0502000000000001" pitchFamily="34" charset="-128"/>
+                <a:cs typeface="Monotype Sans WT J" panose="020B0502000000000001" pitchFamily="34" charset="-128"/>
+              </a:rPr>
+              <a:t>:  Change in lake storage</a:t>
+            </a:r>
+          </a:p>
+          <a:p>
+            <a:r>
+              <a:rPr lang="en-US" sz="1400" dirty="0" err="1" smtClean="0">
+                <a:latin typeface="Monotype Sans WT J" panose="020B0502000000000001" pitchFamily="34" charset="-128"/>
+                <a:ea typeface="Monotype Sans WT J" panose="020B0502000000000001" pitchFamily="34" charset="-128"/>
+                <a:cs typeface="Monotype Sans WT J" panose="020B0502000000000001" pitchFamily="34" charset="-128"/>
+              </a:rPr>
+              <a:t>divr</a:t>
+            </a:r>
+            <a:r>
+              <a:rPr lang="en-US" sz="1400" dirty="0" smtClean="0">
+                <a:latin typeface="Monotype Sans WT J" panose="020B0502000000000001" pitchFamily="34" charset="-128"/>
+                <a:ea typeface="Monotype Sans WT J" panose="020B0502000000000001" pitchFamily="34" charset="-128"/>
+                <a:cs typeface="Monotype Sans WT J" panose="020B0502000000000001" pitchFamily="34" charset="-128"/>
+              </a:rPr>
+              <a:t>:   Diversions into Lake      </a:t>
+            </a:r>
+          </a:p>
+          <a:p>
+            <a:r>
+              <a:rPr lang="en-US" sz="1400" dirty="0">
+                <a:latin typeface="Monotype Sans WT J" panose="020B0502000000000001" pitchFamily="34" charset="-128"/>
+                <a:ea typeface="Monotype Sans WT J" panose="020B0502000000000001" pitchFamily="34" charset="-128"/>
+                <a:cs typeface="Monotype Sans WT J" panose="020B0502000000000001" pitchFamily="34" charset="-128"/>
+              </a:rPr>
+              <a:t> </a:t>
+            </a:r>
+            <a:r>
+              <a:rPr lang="en-US" sz="1400" dirty="0" smtClean="0">
+                <a:latin typeface="Monotype Sans WT J" panose="020B0502000000000001" pitchFamily="34" charset="-128"/>
+                <a:ea typeface="Monotype Sans WT J" panose="020B0502000000000001" pitchFamily="34" charset="-128"/>
+                <a:cs typeface="Monotype Sans WT J" panose="020B0502000000000001" pitchFamily="34" charset="-128"/>
+              </a:rPr>
+              <a:t>         Superior </a:t>
+            </a:r>
+            <a:endParaRPr lang="en-US" sz="1400" dirty="0">
+              <a:latin typeface="Monotype Sans WT J" panose="020B0502000000000001" pitchFamily="34" charset="-128"/>
+              <a:ea typeface="Monotype Sans WT J" panose="020B0502000000000001" pitchFamily="34" charset="-128"/>
+              <a:cs typeface="Monotype Sans WT J" panose="020B0502000000000001" pitchFamily="34" charset="-128"/>
+            </a:endParaRPr>
+          </a:p>
+        </p:txBody>
+      </p:sp>
     </p:spTree>
     <p:extLst>
       <p:ext uri="{BB962C8B-B14F-4D97-AF65-F5344CB8AC3E}">
@@ -1849,6 +2121,195 @@
           </a:extLst>
         </p:spPr>
       </p:pic>
+      <p:sp>
+        <p:nvSpPr>
+          <p:cNvPr id="3" name="TextBox 2"/>
+          <p:cNvSpPr txBox="1"/>
+          <p:nvPr/>
+        </p:nvSpPr>
+        <p:spPr>
+          <a:xfrm>
+            <a:off x="4343400" y="1853210"/>
+            <a:ext cx="1447800" cy="276999"/>
+          </a:xfrm>
+          <a:prstGeom prst="rect">
+            <a:avLst/>
+          </a:prstGeom>
+          <a:noFill/>
+        </p:spPr>
+        <p:txBody>
+          <a:bodyPr wrap="square" rtlCol="0">
+            <a:spAutoFit/>
+          </a:bodyPr>
+          <a:lstStyle/>
+          <a:p>
+            <a:r>
+              <a:rPr lang="en-US" sz="1200" dirty="0" smtClean="0"/>
+              <a:t>Line of agreement</a:t>
+            </a:r>
+            <a:endParaRPr lang="en-US" sz="1200" dirty="0"/>
+          </a:p>
+        </p:txBody>
+      </p:sp>
+      <p:cxnSp>
+        <p:nvCxnSpPr>
+          <p:cNvPr id="6" name="Straight Arrow Connector 5"/>
+          <p:cNvCxnSpPr>
+            <a:stCxn id="3" idx="3"/>
+          </p:cNvCxnSpPr>
+          <p:nvPr/>
+        </p:nvCxnSpPr>
+        <p:spPr bwMode="auto">
+          <a:xfrm>
+            <a:off x="5791200" y="1991710"/>
+            <a:ext cx="381000" cy="370490"/>
+          </a:xfrm>
+          <a:prstGeom prst="straightConnector1">
+            <a:avLst/>
+          </a:prstGeom>
+          <a:solidFill>
+            <a:schemeClr val="accent1"/>
+          </a:solidFill>
+          <a:ln w="12700" cap="flat" cmpd="sng" algn="ctr">
+            <a:solidFill>
+              <a:schemeClr val="tx1"/>
+            </a:solidFill>
+            <a:prstDash val="solid"/>
+            <a:round/>
+            <a:headEnd type="none" w="med" len="med"/>
+            <a:tailEnd type="arrow"/>
+          </a:ln>
+          <a:effectLst/>
+        </p:spPr>
+      </p:cxnSp>
+      <p:sp>
+        <p:nvSpPr>
+          <p:cNvPr id="11" name="Rounded Rectangle 10"/>
+          <p:cNvSpPr/>
+          <p:nvPr/>
+        </p:nvSpPr>
+        <p:spPr bwMode="auto">
+          <a:xfrm rot="19442265">
+            <a:off x="5448752" y="2209209"/>
+            <a:ext cx="2626927" cy="1537136"/>
+          </a:xfrm>
+          <a:prstGeom prst="roundRect">
+            <a:avLst/>
+          </a:prstGeom>
+          <a:solidFill>
+            <a:schemeClr val="accent1">
+              <a:alpha val="21000"/>
+            </a:schemeClr>
+          </a:solidFill>
+          <a:ln w="12700" cap="flat" cmpd="sng" algn="ctr">
+            <a:solidFill>
+              <a:schemeClr val="tx1"/>
+            </a:solidFill>
+            <a:prstDash val="solid"/>
+            <a:round/>
+            <a:headEnd type="none" w="med" len="med"/>
+            <a:tailEnd type="none" w="med" len="med"/>
+          </a:ln>
+          <a:effectLst/>
+        </p:spPr>
+        <p:txBody>
+          <a:bodyPr vert="horz" wrap="square" lIns="91440" tIns="45720" rIns="91440" bIns="45720" numCol="1" rtlCol="0" anchor="t" anchorCtr="0" compatLnSpc="1">
+            <a:prstTxWarp prst="textNoShape">
+              <a:avLst/>
+            </a:prstTxWarp>
+          </a:bodyPr>
+          <a:lstStyle/>
+          <a:p>
+            <a:pPr marL="0" marR="0" indent="0" algn="l" defTabSz="914400" rtl="0" eaLnBrk="0" fontAlgn="base" latinLnBrk="0" hangingPunct="0">
+              <a:lnSpc>
+                <a:spcPct val="100000"/>
+              </a:lnSpc>
+              <a:spcBef>
+                <a:spcPct val="0"/>
+              </a:spcBef>
+              <a:spcAft>
+                <a:spcPct val="0"/>
+              </a:spcAft>
+              <a:buClrTx/>
+              <a:buSzTx/>
+              <a:buFontTx/>
+              <a:buNone/>
+              <a:tabLst/>
+            </a:pPr>
+            <a:endParaRPr kumimoji="0" lang="en-US" sz="4000" b="0" i="0" u="none" strike="noStrike" cap="none" normalizeH="0" baseline="0" smtClean="0">
+              <a:ln>
+                <a:noFill/>
+              </a:ln>
+              <a:solidFill>
+                <a:schemeClr val="tx1"/>
+              </a:solidFill>
+              <a:effectLst/>
+              <a:latin typeface="Arial" charset="0"/>
+            </a:endParaRPr>
+          </a:p>
+        </p:txBody>
+      </p:sp>
+      <p:sp>
+        <p:nvSpPr>
+          <p:cNvPr id="12" name="TextBox 11"/>
+          <p:cNvSpPr txBox="1"/>
+          <p:nvPr/>
+        </p:nvSpPr>
+        <p:spPr>
+          <a:xfrm>
+            <a:off x="5838725" y="4648200"/>
+            <a:ext cx="1846980" cy="261610"/>
+          </a:xfrm>
+          <a:prstGeom prst="rect">
+            <a:avLst/>
+          </a:prstGeom>
+          <a:noFill/>
+        </p:spPr>
+        <p:txBody>
+          <a:bodyPr wrap="none" rtlCol="0">
+            <a:spAutoFit/>
+          </a:bodyPr>
+          <a:lstStyle/>
+          <a:p>
+            <a:r>
+              <a:rPr lang="en-US" sz="1100" dirty="0" smtClean="0"/>
+              <a:t>High flows underestimated</a:t>
+            </a:r>
+            <a:endParaRPr lang="en-US" sz="1100" dirty="0"/>
+          </a:p>
+        </p:txBody>
+      </p:sp>
+      <p:cxnSp>
+        <p:nvCxnSpPr>
+          <p:cNvPr id="14" name="Straight Arrow Connector 13"/>
+          <p:cNvCxnSpPr>
+            <a:stCxn id="12" idx="0"/>
+          </p:cNvCxnSpPr>
+          <p:nvPr/>
+        </p:nvCxnSpPr>
+        <p:spPr bwMode="auto">
+          <a:xfrm flipH="1" flipV="1">
+            <a:off x="6400800" y="4191000"/>
+            <a:ext cx="361415" cy="457200"/>
+          </a:xfrm>
+          <a:prstGeom prst="straightConnector1">
+            <a:avLst/>
+          </a:prstGeom>
+          <a:solidFill>
+            <a:schemeClr val="accent1"/>
+          </a:solidFill>
+          <a:ln w="12700" cap="flat" cmpd="sng" algn="ctr">
+            <a:solidFill>
+              <a:schemeClr val="tx1"/>
+            </a:solidFill>
+            <a:prstDash val="solid"/>
+            <a:round/>
+            <a:headEnd type="none" w="med" len="med"/>
+            <a:tailEnd type="arrow"/>
+          </a:ln>
+          <a:effectLst/>
+        </p:spPr>
+      </p:cxnSp>
     </p:spTree>
     <p:extLst>
       <p:ext uri="{BB962C8B-B14F-4D97-AF65-F5344CB8AC3E}">
@@ -1968,6 +2429,67 @@
           </a:extLst>
         </p:spPr>
       </p:pic>
+      <p:sp>
+        <p:nvSpPr>
+          <p:cNvPr id="3" name="TextBox 2"/>
+          <p:cNvSpPr txBox="1"/>
+          <p:nvPr/>
+        </p:nvSpPr>
+        <p:spPr>
+          <a:xfrm>
+            <a:off x="5334000" y="4038600"/>
+            <a:ext cx="2653290" cy="261610"/>
+          </a:xfrm>
+          <a:prstGeom prst="rect">
+            <a:avLst/>
+          </a:prstGeom>
+          <a:noFill/>
+        </p:spPr>
+        <p:txBody>
+          <a:bodyPr wrap="none" rtlCol="0">
+            <a:spAutoFit/>
+          </a:bodyPr>
+          <a:lstStyle/>
+          <a:p>
+            <a:r>
+              <a:rPr lang="en-US" sz="1100" dirty="0" smtClean="0"/>
+              <a:t>Threshold for significant autocorrelation</a:t>
+            </a:r>
+            <a:endParaRPr lang="en-US" sz="1100" dirty="0"/>
+          </a:p>
+        </p:txBody>
+      </p:sp>
+      <p:cxnSp>
+        <p:nvCxnSpPr>
+          <p:cNvPr id="5" name="Straight Arrow Connector 4"/>
+          <p:cNvCxnSpPr>
+            <a:stCxn id="3" idx="2"/>
+          </p:cNvCxnSpPr>
+          <p:nvPr/>
+        </p:nvCxnSpPr>
+        <p:spPr bwMode="auto">
+          <a:xfrm flipH="1">
+            <a:off x="6172200" y="4300210"/>
+            <a:ext cx="488445" cy="805190"/>
+          </a:xfrm>
+          <a:prstGeom prst="straightConnector1">
+            <a:avLst/>
+          </a:prstGeom>
+          <a:solidFill>
+            <a:schemeClr val="accent1"/>
+          </a:solidFill>
+          <a:ln w="12700" cap="flat" cmpd="sng" algn="ctr">
+            <a:solidFill>
+              <a:schemeClr val="tx1"/>
+            </a:solidFill>
+            <a:prstDash val="solid"/>
+            <a:round/>
+            <a:headEnd type="none" w="med" len="med"/>
+            <a:tailEnd type="arrow"/>
+          </a:ln>
+          <a:effectLst/>
+        </p:spPr>
+      </p:cxnSp>
     </p:spTree>
     <p:extLst>
       <p:ext uri="{BB962C8B-B14F-4D97-AF65-F5344CB8AC3E}">
@@ -2017,7 +2539,7 @@
         </p:nvSpPr>
         <p:spPr>
           <a:xfrm>
-            <a:off x="381000" y="152400"/>
+            <a:off x="404648" y="228600"/>
             <a:ext cx="8305800" cy="762000"/>
           </a:xfrm>
         </p:spPr>
@@ -2027,7 +2549,7 @@
           <a:p>
             <a:r>
               <a:rPr lang="en-US" dirty="0" smtClean="0"/>
-              <a:t>AR Multiple Regression Models</a:t>
+              <a:t>Autoregressive (AR) Multiple Regression Models</a:t>
             </a:r>
             <a:endParaRPr lang="en-US" dirty="0"/>
           </a:p>
@@ -2056,7 +2578,7 @@
         </p:blipFill>
         <p:spPr bwMode="auto">
           <a:xfrm>
-            <a:off x="152401" y="1981200"/>
+            <a:off x="152401" y="1524000"/>
             <a:ext cx="4419599" cy="1939129"/>
           </a:xfrm>
           <a:prstGeom prst="rect">
@@ -2110,7 +2632,7 @@
         </p:blipFill>
         <p:spPr bwMode="auto">
           <a:xfrm>
-            <a:off x="152401" y="4191000"/>
+            <a:off x="152401" y="3505200"/>
             <a:ext cx="4065377" cy="533400"/>
           </a:xfrm>
           <a:prstGeom prst="rect">
@@ -2164,7 +2686,7 @@
         </p:blipFill>
         <p:spPr bwMode="auto">
           <a:xfrm>
-            <a:off x="4800600" y="1752600"/>
+            <a:off x="4800600" y="1295400"/>
             <a:ext cx="4234593" cy="2152650"/>
           </a:xfrm>
           <a:prstGeom prst="rect">
@@ -2218,7 +2740,7 @@
         </p:blipFill>
         <p:spPr bwMode="auto">
           <a:xfrm>
-            <a:off x="4824248" y="4207873"/>
+            <a:off x="4824248" y="3505200"/>
             <a:ext cx="3886200" cy="499654"/>
           </a:xfrm>
           <a:prstGeom prst="rect">
@@ -2272,7 +2794,7 @@
         </p:blipFill>
         <p:spPr bwMode="auto">
           <a:xfrm>
-            <a:off x="152401" y="5029200"/>
+            <a:off x="152401" y="4800600"/>
             <a:ext cx="4473494" cy="1219200"/>
           </a:xfrm>
           <a:prstGeom prst="rect">
@@ -2326,7 +2848,7 @@
         </p:blipFill>
         <p:spPr bwMode="auto">
           <a:xfrm>
-            <a:off x="4800600" y="5105400"/>
+            <a:off x="4800600" y="4876800"/>
             <a:ext cx="4236747" cy="1066800"/>
           </a:xfrm>
           <a:prstGeom prst="rect">
@@ -2357,6 +2879,266 @@
           </a:extLst>
         </p:spPr>
       </p:pic>
+      <p:sp>
+        <p:nvSpPr>
+          <p:cNvPr id="3" name="TextBox 2"/>
+          <p:cNvSpPr txBox="1"/>
+          <p:nvPr/>
+        </p:nvSpPr>
+        <p:spPr>
+          <a:xfrm>
+            <a:off x="239766" y="6336268"/>
+            <a:ext cx="4913525" cy="261610"/>
+          </a:xfrm>
+          <a:prstGeom prst="rect">
+            <a:avLst/>
+          </a:prstGeom>
+          <a:solidFill>
+            <a:schemeClr val="bg1">
+              <a:lumMod val="95000"/>
+            </a:schemeClr>
+          </a:solidFill>
+        </p:spPr>
+        <p:txBody>
+          <a:bodyPr wrap="none" rtlCol="0">
+            <a:spAutoFit/>
+          </a:bodyPr>
+          <a:lstStyle/>
+          <a:p>
+            <a:r>
+              <a:rPr lang="en-US" sz="1100" dirty="0" smtClean="0"/>
+              <a:t>ar01Stmr: lag</a:t>
+            </a:r>
+            <a:r>
+              <a:rPr lang="en-US" sz="1100" baseline="-25000" dirty="0" smtClean="0"/>
+              <a:t>1</a:t>
+            </a:r>
+            <a:r>
+              <a:rPr lang="en-US" sz="1100" dirty="0" smtClean="0"/>
+              <a:t> St. Marys River Flows; ar02Stmr: lag</a:t>
+            </a:r>
+            <a:r>
+              <a:rPr lang="en-US" sz="1100" baseline="-25000" dirty="0" smtClean="0"/>
+              <a:t>2</a:t>
+            </a:r>
+            <a:r>
+              <a:rPr lang="en-US" sz="1100" dirty="0" smtClean="0"/>
+              <a:t> St. Marys River Flows.</a:t>
+            </a:r>
+            <a:endParaRPr lang="en-US" sz="1100" dirty="0"/>
+          </a:p>
+        </p:txBody>
+      </p:sp>
+      <p:sp>
+        <p:nvSpPr>
+          <p:cNvPr id="4" name="TextBox 3"/>
+          <p:cNvSpPr txBox="1"/>
+          <p:nvPr/>
+        </p:nvSpPr>
+        <p:spPr>
+          <a:xfrm>
+            <a:off x="2539304" y="4800600"/>
+            <a:ext cx="2077364" cy="276999"/>
+          </a:xfrm>
+          <a:prstGeom prst="rect">
+            <a:avLst/>
+          </a:prstGeom>
+          <a:noFill/>
+        </p:spPr>
+        <p:txBody>
+          <a:bodyPr wrap="none" rtlCol="0">
+            <a:spAutoFit/>
+          </a:bodyPr>
+          <a:lstStyle/>
+          <a:p>
+            <a:r>
+              <a:rPr lang="en-US" sz="1200" dirty="0" smtClean="0"/>
+              <a:t>Compare </a:t>
+            </a:r>
+            <a:r>
+              <a:rPr lang="en-US" sz="1200" dirty="0" err="1" smtClean="0"/>
+              <a:t>MultReg</a:t>
+            </a:r>
+            <a:r>
+              <a:rPr lang="en-US" sz="1200" dirty="0" smtClean="0"/>
+              <a:t> with AR</a:t>
+            </a:r>
+            <a:r>
+              <a:rPr lang="en-US" sz="1200" baseline="-25000" dirty="0" smtClean="0"/>
+              <a:t>2</a:t>
+            </a:r>
+            <a:endParaRPr lang="en-US" sz="1200" baseline="-25000" dirty="0"/>
+          </a:p>
+        </p:txBody>
+      </p:sp>
+      <p:sp>
+        <p:nvSpPr>
+          <p:cNvPr id="11" name="TextBox 10"/>
+          <p:cNvSpPr txBox="1"/>
+          <p:nvPr/>
+        </p:nvSpPr>
+        <p:spPr>
+          <a:xfrm>
+            <a:off x="7222461" y="4876800"/>
+            <a:ext cx="1769139" cy="276999"/>
+          </a:xfrm>
+          <a:prstGeom prst="rect">
+            <a:avLst/>
+          </a:prstGeom>
+          <a:noFill/>
+        </p:spPr>
+        <p:txBody>
+          <a:bodyPr wrap="none" rtlCol="0">
+            <a:spAutoFit/>
+          </a:bodyPr>
+          <a:lstStyle/>
+          <a:p>
+            <a:r>
+              <a:rPr lang="en-US" sz="1200" dirty="0" smtClean="0"/>
+              <a:t>Compare AR</a:t>
+            </a:r>
+            <a:r>
+              <a:rPr lang="en-US" sz="1200" baseline="-25000" dirty="0" smtClean="0"/>
+              <a:t>1</a:t>
+            </a:r>
+            <a:r>
+              <a:rPr lang="en-US" sz="1200" dirty="0" smtClean="0"/>
+              <a:t> with AR</a:t>
+            </a:r>
+            <a:r>
+              <a:rPr lang="en-US" sz="1200" baseline="-25000" dirty="0" smtClean="0"/>
+              <a:t>2</a:t>
+            </a:r>
+            <a:endParaRPr lang="en-US" sz="1200" baseline="-25000" dirty="0"/>
+          </a:p>
+        </p:txBody>
+      </p:sp>
+      <p:sp>
+        <p:nvSpPr>
+          <p:cNvPr id="5" name="Oval 4"/>
+          <p:cNvSpPr/>
+          <p:nvPr/>
+        </p:nvSpPr>
+        <p:spPr bwMode="auto">
+          <a:xfrm>
+            <a:off x="6917896" y="5715000"/>
+            <a:ext cx="702104" cy="304800"/>
+          </a:xfrm>
+          <a:prstGeom prst="ellipse">
+            <a:avLst/>
+          </a:prstGeom>
+          <a:noFill/>
+          <a:ln w="12700" cap="flat" cmpd="sng" algn="ctr">
+            <a:solidFill>
+              <a:srgbClr val="FF0000"/>
+            </a:solidFill>
+            <a:prstDash val="solid"/>
+            <a:round/>
+            <a:headEnd type="none" w="med" len="med"/>
+            <a:tailEnd type="none" w="med" len="med"/>
+          </a:ln>
+          <a:effectLst/>
+        </p:spPr>
+        <p:txBody>
+          <a:bodyPr vert="horz" wrap="square" lIns="91440" tIns="45720" rIns="91440" bIns="45720" numCol="1" rtlCol="0" anchor="t" anchorCtr="0" compatLnSpc="1">
+            <a:prstTxWarp prst="textNoShape">
+              <a:avLst/>
+            </a:prstTxWarp>
+          </a:bodyPr>
+          <a:lstStyle/>
+          <a:p>
+            <a:pPr marL="0" marR="0" indent="0" algn="l" defTabSz="914400" rtl="0" eaLnBrk="0" fontAlgn="base" latinLnBrk="0" hangingPunct="0">
+              <a:lnSpc>
+                <a:spcPct val="100000"/>
+              </a:lnSpc>
+              <a:spcBef>
+                <a:spcPct val="0"/>
+              </a:spcBef>
+              <a:spcAft>
+                <a:spcPct val="0"/>
+              </a:spcAft>
+              <a:buClrTx/>
+              <a:buSzTx/>
+              <a:buFontTx/>
+              <a:buNone/>
+              <a:tabLst/>
+            </a:pPr>
+            <a:endParaRPr kumimoji="0" lang="en-US" sz="4000" b="0" i="0" u="none" strike="noStrike" cap="none" normalizeH="0" baseline="0" smtClean="0">
+              <a:ln>
+                <a:noFill/>
+              </a:ln>
+              <a:solidFill>
+                <a:schemeClr val="tx1"/>
+              </a:solidFill>
+              <a:effectLst/>
+              <a:latin typeface="Arial" charset="0"/>
+            </a:endParaRPr>
+          </a:p>
+        </p:txBody>
+      </p:sp>
+      <p:sp>
+        <p:nvSpPr>
+          <p:cNvPr id="13" name="Oval 12"/>
+          <p:cNvSpPr/>
+          <p:nvPr/>
+        </p:nvSpPr>
+        <p:spPr bwMode="auto">
+          <a:xfrm>
+            <a:off x="2345476" y="5686097"/>
+            <a:ext cx="702104" cy="304800"/>
+          </a:xfrm>
+          <a:prstGeom prst="ellipse">
+            <a:avLst/>
+          </a:prstGeom>
+          <a:noFill/>
+          <a:ln w="12700" cap="flat" cmpd="sng" algn="ctr">
+            <a:solidFill>
+              <a:srgbClr val="FF0000"/>
+            </a:solidFill>
+            <a:prstDash val="solid"/>
+            <a:round/>
+            <a:headEnd type="none" w="med" len="med"/>
+            <a:tailEnd type="none" w="med" len="med"/>
+          </a:ln>
+          <a:effectLst/>
+        </p:spPr>
+        <p:txBody>
+          <a:bodyPr vert="horz" wrap="square" lIns="91440" tIns="45720" rIns="91440" bIns="45720" numCol="1" rtlCol="0" anchor="t" anchorCtr="0" compatLnSpc="1">
+            <a:prstTxWarp prst="textNoShape">
+              <a:avLst/>
+            </a:prstTxWarp>
+          </a:bodyPr>
+          <a:lstStyle/>
+          <a:p>
+            <a:pPr marL="0" marR="0" indent="0" algn="l" defTabSz="914400" rtl="0" eaLnBrk="0" fontAlgn="base" latinLnBrk="0" hangingPunct="0">
+              <a:lnSpc>
+                <a:spcPct val="100000"/>
+              </a:lnSpc>
+              <a:spcBef>
+                <a:spcPct val="0"/>
+              </a:spcBef>
+              <a:spcAft>
+                <a:spcPct val="0"/>
+              </a:spcAft>
+              <a:buClrTx/>
+              <a:buSzTx/>
+              <a:buFontTx/>
+              <a:buNone/>
+              <a:tabLst/>
+            </a:pPr>
+            <a:endParaRPr kumimoji="0" lang="en-US" sz="4000" b="0" i="0" u="none" strike="noStrike" cap="none" normalizeH="0" baseline="0" smtClean="0">
+              <a:ln>
+                <a:noFill/>
+              </a:ln>
+              <a:solidFill>
+                <a:schemeClr val="tx1"/>
+              </a:solidFill>
+              <a:effectLst/>
+              <a:latin typeface="Arial" charset="0"/>
+            </a:endParaRPr>
+          </a:p>
+        </p:txBody>
+      </p:sp>
     </p:spTree>
     <p:extLst>
       <p:ext uri="{BB962C8B-B14F-4D97-AF65-F5344CB8AC3E}">
@@ -2476,6 +3258,36 @@
           </a:extLst>
         </p:spPr>
       </p:pic>
+      <p:sp>
+        <p:nvSpPr>
+          <p:cNvPr id="3" name="TextBox 2"/>
+          <p:cNvSpPr txBox="1"/>
+          <p:nvPr/>
+        </p:nvSpPr>
+        <p:spPr>
+          <a:xfrm>
+            <a:off x="1981200" y="2133600"/>
+            <a:ext cx="4975593" cy="276999"/>
+          </a:xfrm>
+          <a:prstGeom prst="rect">
+            <a:avLst/>
+          </a:prstGeom>
+          <a:noFill/>
+        </p:spPr>
+        <p:txBody>
+          <a:bodyPr wrap="none" rtlCol="0">
+            <a:spAutoFit/>
+          </a:bodyPr>
+          <a:lstStyle/>
+          <a:p>
+            <a:r>
+              <a:rPr lang="en-US" sz="1200" dirty="0" smtClean="0"/>
+              <a:t>Autocorrelation Function of AR2 Model Residuals shows no correlation.</a:t>
+            </a:r>
+            <a:endParaRPr lang="en-US" sz="1200" dirty="0"/>
+          </a:p>
+        </p:txBody>
+      </p:sp>
     </p:spTree>
     <p:extLst>
       <p:ext uri="{BB962C8B-B14F-4D97-AF65-F5344CB8AC3E}">
@@ -2595,6 +3407,36 @@
           </a:extLst>
         </p:spPr>
       </p:pic>
+      <p:sp>
+        <p:nvSpPr>
+          <p:cNvPr id="3" name="TextBox 2"/>
+          <p:cNvSpPr txBox="1"/>
+          <p:nvPr/>
+        </p:nvSpPr>
+        <p:spPr>
+          <a:xfrm>
+            <a:off x="3657600" y="2183156"/>
+            <a:ext cx="2751074" cy="276999"/>
+          </a:xfrm>
+          <a:prstGeom prst="rect">
+            <a:avLst/>
+          </a:prstGeom>
+          <a:noFill/>
+        </p:spPr>
+        <p:txBody>
+          <a:bodyPr wrap="none" rtlCol="0">
+            <a:spAutoFit/>
+          </a:bodyPr>
+          <a:lstStyle/>
+          <a:p>
+            <a:r>
+              <a:rPr lang="en-US" sz="1200" dirty="0" smtClean="0"/>
+              <a:t>Problem of under prediction reduced. </a:t>
+            </a:r>
+            <a:endParaRPr lang="en-US" sz="1200" dirty="0"/>
+          </a:p>
+        </p:txBody>
+      </p:sp>
     </p:spTree>
     <p:extLst>
       <p:ext uri="{BB962C8B-B14F-4D97-AF65-F5344CB8AC3E}">
@@ -2714,6 +3556,105 @@
           </a:extLst>
         </p:spPr>
       </p:pic>
+      <p:sp>
+        <p:nvSpPr>
+          <p:cNvPr id="3" name="Rectangle 2"/>
+          <p:cNvSpPr/>
+          <p:nvPr/>
+        </p:nvSpPr>
+        <p:spPr bwMode="auto">
+          <a:xfrm>
+            <a:off x="1905000" y="2362200"/>
+            <a:ext cx="1066800" cy="2438400"/>
+          </a:xfrm>
+          <a:prstGeom prst="rect">
+            <a:avLst/>
+          </a:prstGeom>
+          <a:noFill/>
+          <a:ln w="12700" cap="flat" cmpd="sng" algn="ctr">
+            <a:solidFill>
+              <a:srgbClr val="FF0000"/>
+            </a:solidFill>
+            <a:prstDash val="solid"/>
+            <a:round/>
+            <a:headEnd type="none" w="med" len="med"/>
+            <a:tailEnd type="none" w="med" len="med"/>
+          </a:ln>
+          <a:effectLst/>
+        </p:spPr>
+        <p:txBody>
+          <a:bodyPr vert="horz" wrap="square" lIns="91440" tIns="45720" rIns="91440" bIns="45720" numCol="1" rtlCol="0" anchor="t" anchorCtr="0" compatLnSpc="1">
+            <a:prstTxWarp prst="textNoShape">
+              <a:avLst/>
+            </a:prstTxWarp>
+          </a:bodyPr>
+          <a:lstStyle/>
+          <a:p>
+            <a:pPr marL="0" marR="0" indent="0" algn="l" defTabSz="914400" rtl="0" eaLnBrk="0" fontAlgn="base" latinLnBrk="0" hangingPunct="0">
+              <a:lnSpc>
+                <a:spcPct val="100000"/>
+              </a:lnSpc>
+              <a:spcBef>
+                <a:spcPct val="0"/>
+              </a:spcBef>
+              <a:spcAft>
+                <a:spcPct val="0"/>
+              </a:spcAft>
+              <a:buClrTx/>
+              <a:buSzTx/>
+              <a:buFontTx/>
+              <a:buNone/>
+              <a:tabLst/>
+            </a:pPr>
+            <a:endParaRPr kumimoji="0" lang="en-US" sz="4000" b="0" i="0" u="none" strike="noStrike" cap="none" normalizeH="0" baseline="0" smtClean="0">
+              <a:ln>
+                <a:noFill/>
+              </a:ln>
+              <a:solidFill>
+                <a:schemeClr val="tx1"/>
+              </a:solidFill>
+              <a:effectLst/>
+              <a:latin typeface="Arial" charset="0"/>
+            </a:endParaRPr>
+          </a:p>
+        </p:txBody>
+      </p:sp>
+      <p:sp>
+        <p:nvSpPr>
+          <p:cNvPr id="4" name="TextBox 3"/>
+          <p:cNvSpPr txBox="1"/>
+          <p:nvPr/>
+        </p:nvSpPr>
+        <p:spPr>
+          <a:xfrm>
+            <a:off x="1752600" y="1752600"/>
+            <a:ext cx="1582484" cy="461665"/>
+          </a:xfrm>
+          <a:prstGeom prst="rect">
+            <a:avLst/>
+          </a:prstGeom>
+          <a:noFill/>
+        </p:spPr>
+        <p:txBody>
+          <a:bodyPr wrap="none" rtlCol="0">
+            <a:spAutoFit/>
+          </a:bodyPr>
+          <a:lstStyle/>
+          <a:p>
+            <a:r>
+              <a:rPr lang="en-US" sz="1200" dirty="0" smtClean="0"/>
+              <a:t>Possible bias in Jan </a:t>
+            </a:r>
+          </a:p>
+          <a:p>
+            <a:r>
+              <a:rPr lang="en-US" sz="1200" dirty="0" smtClean="0"/>
+              <a:t>and Feb residuals</a:t>
+            </a:r>
+            <a:endParaRPr lang="en-US" sz="1200" dirty="0"/>
+          </a:p>
+        </p:txBody>
+      </p:sp>
     </p:spTree>
     <p:extLst>
       <p:ext uri="{BB962C8B-B14F-4D97-AF65-F5344CB8AC3E}">
@@ -2773,7 +3714,7 @@
           <a:p>
             <a:r>
               <a:rPr lang="en-US" dirty="0" smtClean="0"/>
-              <a:t>Seasonality: Jan-Feb and Mar-Dec</a:t>
+              <a:t>Seasonal Model: Jan-Feb and Mar-Dec</a:t>
             </a:r>
             <a:endParaRPr lang="en-US" dirty="0"/>
           </a:p>
@@ -2856,7 +3797,7 @@
         </p:blipFill>
         <p:spPr bwMode="auto">
           <a:xfrm>
-            <a:off x="76199" y="4495800"/>
+            <a:off x="76199" y="3962400"/>
             <a:ext cx="4343401" cy="568508"/>
           </a:xfrm>
           <a:prstGeom prst="rect">
@@ -2964,7 +3905,7 @@
         </p:blipFill>
         <p:spPr bwMode="auto">
           <a:xfrm>
-            <a:off x="4724400" y="4495800"/>
+            <a:off x="4724400" y="3962400"/>
             <a:ext cx="4310114" cy="533400"/>
           </a:xfrm>
           <a:prstGeom prst="rect">
@@ -2995,6 +3936,216 @@
           </a:extLst>
         </p:spPr>
       </p:pic>
+      <p:sp>
+        <p:nvSpPr>
+          <p:cNvPr id="3" name="TextBox 2"/>
+          <p:cNvSpPr txBox="1"/>
+          <p:nvPr/>
+        </p:nvSpPr>
+        <p:spPr>
+          <a:xfrm>
+            <a:off x="228600" y="1459468"/>
+            <a:ext cx="4038600" cy="369332"/>
+          </a:xfrm>
+          <a:prstGeom prst="rect">
+            <a:avLst/>
+          </a:prstGeom>
+          <a:solidFill>
+            <a:schemeClr val="bg1">
+              <a:lumMod val="95000"/>
+            </a:schemeClr>
+          </a:solidFill>
+        </p:spPr>
+        <p:txBody>
+          <a:bodyPr wrap="square" rtlCol="0">
+            <a:spAutoFit/>
+          </a:bodyPr>
+          <a:lstStyle/>
+          <a:p>
+            <a:r>
+              <a:rPr lang="en-US" dirty="0" smtClean="0">
+                <a:solidFill>
+                  <a:srgbClr val="FF0000"/>
+                </a:solidFill>
+              </a:rPr>
+              <a:t>AR2 Multiple Regression for Jan-Feb</a:t>
+            </a:r>
+            <a:endParaRPr lang="en-US" dirty="0">
+              <a:solidFill>
+                <a:srgbClr val="FF0000"/>
+              </a:solidFill>
+            </a:endParaRPr>
+          </a:p>
+        </p:txBody>
+      </p:sp>
+      <p:sp>
+        <p:nvSpPr>
+          <p:cNvPr id="8" name="TextBox 7"/>
+          <p:cNvSpPr txBox="1"/>
+          <p:nvPr/>
+        </p:nvSpPr>
+        <p:spPr>
+          <a:xfrm>
+            <a:off x="4860157" y="1427202"/>
+            <a:ext cx="4038600" cy="369332"/>
+          </a:xfrm>
+          <a:prstGeom prst="rect">
+            <a:avLst/>
+          </a:prstGeom>
+          <a:solidFill>
+            <a:schemeClr val="bg1">
+              <a:lumMod val="95000"/>
+            </a:schemeClr>
+          </a:solidFill>
+        </p:spPr>
+        <p:txBody>
+          <a:bodyPr wrap="square" rtlCol="0">
+            <a:spAutoFit/>
+          </a:bodyPr>
+          <a:lstStyle/>
+          <a:p>
+            <a:r>
+              <a:rPr lang="en-US" dirty="0" smtClean="0">
+                <a:solidFill>
+                  <a:srgbClr val="FF0000"/>
+                </a:solidFill>
+              </a:rPr>
+              <a:t>AR2 Multiple Regression for Mar-Dec</a:t>
+            </a:r>
+            <a:endParaRPr lang="en-US" dirty="0">
+              <a:solidFill>
+                <a:srgbClr val="FF0000"/>
+              </a:solidFill>
+            </a:endParaRPr>
+          </a:p>
+        </p:txBody>
+      </p:sp>
+      <p:sp>
+        <p:nvSpPr>
+          <p:cNvPr id="5" name="Rectangle 4"/>
+          <p:cNvSpPr/>
+          <p:nvPr/>
+        </p:nvSpPr>
+        <p:spPr bwMode="auto">
+          <a:xfrm>
+            <a:off x="2247900" y="4114800"/>
+            <a:ext cx="2095500" cy="228600"/>
+          </a:xfrm>
+          <a:prstGeom prst="rect">
+            <a:avLst/>
+          </a:prstGeom>
+          <a:noFill/>
+          <a:ln w="12700" cap="flat" cmpd="sng" algn="ctr">
+            <a:solidFill>
+              <a:srgbClr val="FF0000"/>
+            </a:solidFill>
+            <a:prstDash val="solid"/>
+            <a:round/>
+            <a:headEnd type="none" w="med" len="med"/>
+            <a:tailEnd type="none" w="med" len="med"/>
+          </a:ln>
+          <a:effectLst/>
+        </p:spPr>
+        <p:txBody>
+          <a:bodyPr vert="horz" wrap="square" lIns="91440" tIns="45720" rIns="91440" bIns="45720" numCol="1" rtlCol="0" anchor="t" anchorCtr="0" compatLnSpc="1">
+            <a:prstTxWarp prst="textNoShape">
+              <a:avLst/>
+            </a:prstTxWarp>
+          </a:bodyPr>
+          <a:lstStyle/>
+          <a:p>
+            <a:pPr marL="0" marR="0" indent="0" algn="l" defTabSz="914400" rtl="0" eaLnBrk="0" fontAlgn="base" latinLnBrk="0" hangingPunct="0">
+              <a:lnSpc>
+                <a:spcPct val="100000"/>
+              </a:lnSpc>
+              <a:spcBef>
+                <a:spcPct val="0"/>
+              </a:spcBef>
+              <a:spcAft>
+                <a:spcPct val="0"/>
+              </a:spcAft>
+              <a:buClrTx/>
+              <a:buSzTx/>
+              <a:buFontTx/>
+              <a:buNone/>
+              <a:tabLst/>
+            </a:pPr>
+            <a:endParaRPr kumimoji="0" lang="en-US" sz="4000" b="0" i="0" u="none" strike="noStrike" cap="none" normalizeH="0" baseline="0" smtClean="0">
+              <a:ln>
+                <a:noFill/>
+              </a:ln>
+              <a:solidFill>
+                <a:schemeClr val="tx1"/>
+              </a:solidFill>
+              <a:effectLst/>
+              <a:latin typeface="Arial" charset="0"/>
+            </a:endParaRPr>
+          </a:p>
+        </p:txBody>
+      </p:sp>
+      <p:sp>
+        <p:nvSpPr>
+          <p:cNvPr id="11" name="Rectangle 10"/>
+          <p:cNvSpPr/>
+          <p:nvPr/>
+        </p:nvSpPr>
+        <p:spPr bwMode="auto">
+          <a:xfrm>
+            <a:off x="6918871" y="4114800"/>
+            <a:ext cx="2095500" cy="228600"/>
+          </a:xfrm>
+          <a:prstGeom prst="rect">
+            <a:avLst/>
+          </a:prstGeom>
+          <a:noFill/>
+          <a:ln w="12700" cap="flat" cmpd="sng" algn="ctr">
+            <a:solidFill>
+              <a:srgbClr val="FF0000"/>
+            </a:solidFill>
+            <a:prstDash val="solid"/>
+            <a:round/>
+            <a:headEnd type="none" w="med" len="med"/>
+            <a:tailEnd type="none" w="med" len="med"/>
+          </a:ln>
+          <a:effectLst/>
+        </p:spPr>
+        <p:txBody>
+          <a:bodyPr vert="horz" wrap="square" lIns="91440" tIns="45720" rIns="91440" bIns="45720" numCol="1" rtlCol="0" anchor="t" anchorCtr="0" compatLnSpc="1">
+            <a:prstTxWarp prst="textNoShape">
+              <a:avLst/>
+            </a:prstTxWarp>
+          </a:bodyPr>
+          <a:lstStyle/>
+          <a:p>
+            <a:pPr marL="0" marR="0" indent="0" algn="l" defTabSz="914400" rtl="0" eaLnBrk="0" fontAlgn="base" latinLnBrk="0" hangingPunct="0">
+              <a:lnSpc>
+                <a:spcPct val="100000"/>
+              </a:lnSpc>
+              <a:spcBef>
+                <a:spcPct val="0"/>
+              </a:spcBef>
+              <a:spcAft>
+                <a:spcPct val="0"/>
+              </a:spcAft>
+              <a:buClrTx/>
+              <a:buSzTx/>
+              <a:buFontTx/>
+              <a:buNone/>
+              <a:tabLst/>
+            </a:pPr>
+            <a:endParaRPr kumimoji="0" lang="en-US" sz="4000" b="0" i="0" u="none" strike="noStrike" cap="none" normalizeH="0" baseline="0" smtClean="0">
+              <a:ln>
+                <a:noFill/>
+              </a:ln>
+              <a:solidFill>
+                <a:schemeClr val="tx1"/>
+              </a:solidFill>
+              <a:effectLst/>
+              <a:latin typeface="Arial" charset="0"/>
+            </a:endParaRPr>
+          </a:p>
+        </p:txBody>
+      </p:sp>
     </p:spTree>
     <p:extLst>
       <p:ext uri="{BB962C8B-B14F-4D97-AF65-F5344CB8AC3E}">

</xml_diff>